<commit_message>
revision for ce wen
</commit_message>
<xml_diff>
--- a/figures/地震勘探算法与资源需求.pptx
+++ b/figures/地震勘探算法与资源需求.pptx
@@ -243,7 +243,7 @@
           <a:p>
             <a:fld id="{C29F919D-8149-2448-BEDA-229BF214BE8F}" type="datetimeFigureOut">
               <a:rPr kumimoji="1" lang="zh-CN" altLang="en-US" smtClean="0"/>
-              <a:t>2018/3/21</a:t>
+              <a:t>2018/4/9</a:t>
             </a:fld>
             <a:endParaRPr kumimoji="1" lang="zh-CN" altLang="en-US"/>
           </a:p>
@@ -408,7 +408,7 @@
           <a:p>
             <a:fld id="{C29F919D-8149-2448-BEDA-229BF214BE8F}" type="datetimeFigureOut">
               <a:rPr kumimoji="1" lang="zh-CN" altLang="en-US" smtClean="0"/>
-              <a:t>2018/3/21</a:t>
+              <a:t>2018/4/9</a:t>
             </a:fld>
             <a:endParaRPr kumimoji="1" lang="zh-CN" altLang="en-US"/>
           </a:p>
@@ -583,7 +583,7 @@
           <a:p>
             <a:fld id="{C29F919D-8149-2448-BEDA-229BF214BE8F}" type="datetimeFigureOut">
               <a:rPr kumimoji="1" lang="zh-CN" altLang="en-US" smtClean="0"/>
-              <a:t>2018/3/21</a:t>
+              <a:t>2018/4/9</a:t>
             </a:fld>
             <a:endParaRPr kumimoji="1" lang="zh-CN" altLang="en-US"/>
           </a:p>
@@ -748,7 +748,7 @@
           <a:p>
             <a:fld id="{C29F919D-8149-2448-BEDA-229BF214BE8F}" type="datetimeFigureOut">
               <a:rPr kumimoji="1" lang="zh-CN" altLang="en-US" smtClean="0"/>
-              <a:t>2018/3/21</a:t>
+              <a:t>2018/4/9</a:t>
             </a:fld>
             <a:endParaRPr kumimoji="1" lang="zh-CN" altLang="en-US"/>
           </a:p>
@@ -987,7 +987,7 @@
           <a:p>
             <a:fld id="{C29F919D-8149-2448-BEDA-229BF214BE8F}" type="datetimeFigureOut">
               <a:rPr kumimoji="1" lang="zh-CN" altLang="en-US" smtClean="0"/>
-              <a:t>2018/3/21</a:t>
+              <a:t>2018/4/9</a:t>
             </a:fld>
             <a:endParaRPr kumimoji="1" lang="zh-CN" altLang="en-US"/>
           </a:p>
@@ -1214,7 +1214,7 @@
           <a:p>
             <a:fld id="{C29F919D-8149-2448-BEDA-229BF214BE8F}" type="datetimeFigureOut">
               <a:rPr kumimoji="1" lang="zh-CN" altLang="en-US" smtClean="0"/>
-              <a:t>2018/3/21</a:t>
+              <a:t>2018/4/9</a:t>
             </a:fld>
             <a:endParaRPr kumimoji="1" lang="zh-CN" altLang="en-US"/>
           </a:p>
@@ -1576,7 +1576,7 @@
           <a:p>
             <a:fld id="{C29F919D-8149-2448-BEDA-229BF214BE8F}" type="datetimeFigureOut">
               <a:rPr kumimoji="1" lang="zh-CN" altLang="en-US" smtClean="0"/>
-              <a:t>2018/3/21</a:t>
+              <a:t>2018/4/9</a:t>
             </a:fld>
             <a:endParaRPr kumimoji="1" lang="zh-CN" altLang="en-US"/>
           </a:p>
@@ -1689,7 +1689,7 @@
           <a:p>
             <a:fld id="{C29F919D-8149-2448-BEDA-229BF214BE8F}" type="datetimeFigureOut">
               <a:rPr kumimoji="1" lang="zh-CN" altLang="en-US" smtClean="0"/>
-              <a:t>2018/3/21</a:t>
+              <a:t>2018/4/9</a:t>
             </a:fld>
             <a:endParaRPr kumimoji="1" lang="zh-CN" altLang="en-US"/>
           </a:p>
@@ -1779,7 +1779,7 @@
           <a:p>
             <a:fld id="{C29F919D-8149-2448-BEDA-229BF214BE8F}" type="datetimeFigureOut">
               <a:rPr kumimoji="1" lang="zh-CN" altLang="en-US" smtClean="0"/>
-              <a:t>2018/3/21</a:t>
+              <a:t>2018/4/9</a:t>
             </a:fld>
             <a:endParaRPr kumimoji="1" lang="zh-CN" altLang="en-US"/>
           </a:p>
@@ -2051,7 +2051,7 @@
           <a:p>
             <a:fld id="{C29F919D-8149-2448-BEDA-229BF214BE8F}" type="datetimeFigureOut">
               <a:rPr kumimoji="1" lang="zh-CN" altLang="en-US" smtClean="0"/>
-              <a:t>2018/3/21</a:t>
+              <a:t>2018/4/9</a:t>
             </a:fld>
             <a:endParaRPr kumimoji="1" lang="zh-CN" altLang="en-US"/>
           </a:p>
@@ -2303,7 +2303,7 @@
           <a:p>
             <a:fld id="{C29F919D-8149-2448-BEDA-229BF214BE8F}" type="datetimeFigureOut">
               <a:rPr kumimoji="1" lang="zh-CN" altLang="en-US" smtClean="0"/>
-              <a:t>2018/3/21</a:t>
+              <a:t>2018/4/9</a:t>
             </a:fld>
             <a:endParaRPr kumimoji="1" lang="zh-CN" altLang="en-US"/>
           </a:p>
@@ -2511,7 +2511,7 @@
           <a:p>
             <a:fld id="{C29F919D-8149-2448-BEDA-229BF214BE8F}" type="datetimeFigureOut">
               <a:rPr kumimoji="1" lang="zh-CN" altLang="en-US" smtClean="0"/>
-              <a:t>2018/3/21</a:t>
+              <a:t>2018/4/9</a:t>
             </a:fld>
             <a:endParaRPr kumimoji="1" lang="zh-CN" altLang="en-US"/>
           </a:p>
@@ -2934,6 +2934,8 @@
             <a:solidFill>
               <a:schemeClr val="tx1"/>
             </a:solidFill>
+            <a:headEnd type="none"/>
+            <a:tailEnd type="arrow"/>
           </a:ln>
         </p:spPr>
         <p:style>
@@ -2969,6 +2971,8 @@
             <a:solidFill>
               <a:schemeClr val="tx1"/>
             </a:solidFill>
+            <a:headEnd type="arrow"/>
+            <a:tailEnd type="none"/>
           </a:ln>
         </p:spPr>
         <p:style>
@@ -4554,6 +4558,45 @@
           </p:txBody>
         </p:sp>
       </p:grpSp>
+      <p:sp>
+        <p:nvSpPr>
+          <p:cNvPr id="52" name="TextBox 51"/>
+          <p:cNvSpPr txBox="1"/>
+          <p:nvPr/>
+        </p:nvSpPr>
+        <p:spPr>
+          <a:xfrm>
+            <a:off x="925789" y="4753890"/>
+            <a:ext cx="250390" cy="261610"/>
+          </a:xfrm>
+          <a:prstGeom prst="rect">
+            <a:avLst/>
+          </a:prstGeom>
+          <a:noFill/>
+        </p:spPr>
+        <p:txBody>
+          <a:bodyPr wrap="none" rtlCol="0">
+            <a:spAutoFit/>
+          </a:bodyPr>
+          <a:lstStyle/>
+          <a:p>
+            <a:pPr algn="r"/>
+            <a:r>
+              <a:rPr lang="en-US" altLang="zh-CN" sz="1100" dirty="0">
+                <a:latin typeface="Songti SC" charset="-122"/>
+                <a:ea typeface="Songti SC" charset="-122"/>
+                <a:cs typeface="Songti SC" charset="-122"/>
+              </a:rPr>
+              <a:t>0</a:t>
+            </a:r>
+            <a:endParaRPr lang="en-US" sz="1100" dirty="0">
+              <a:latin typeface="Songti SC" charset="-122"/>
+              <a:ea typeface="Songti SC" charset="-122"/>
+              <a:cs typeface="Songti SC" charset="-122"/>
+            </a:endParaRPr>
+          </a:p>
+        </p:txBody>
+      </p:sp>
     </p:spTree>
     <p:extLst>
       <p:ext uri="{BB962C8B-B14F-4D97-AF65-F5344CB8AC3E}">

</xml_diff>